<commit_message>
updated courses and labs for software engineering
</commit_message>
<xml_diff>
--- a/Anul 3/Semestrul 1/Inginerie Software/Laborator/Lab 1 - Team Formation.pptx
+++ b/Anul 3/Semestrul 1/Inginerie Software/Laborator/Lab 1 - Team Formation.pptx
@@ -2,19 +2,19 @@
 <file path=ppt/presentation.xml><?xml version="1.0" encoding="utf-8"?>
 <p:presentation xmlns:a="http://schemas.openxmlformats.org/drawingml/2006/main" xmlns:r="http://schemas.openxmlformats.org/officeDocument/2006/relationships" xmlns:p="http://schemas.openxmlformats.org/presentationml/2006/main" strictFirstAndLastChars="0" saveSubsetFonts="1" autoCompressPictures="0">
   <p:sldMasterIdLst>
-    <p:sldMasterId id="2147483648" r:id="rId1"/>
+    <p:sldMasterId id="2147483648" r:id="rId4"/>
   </p:sldMasterIdLst>
   <p:notesMasterIdLst>
-    <p:notesMasterId r:id="rId9"/>
+    <p:notesMasterId r:id="rId12"/>
   </p:notesMasterIdLst>
   <p:sldIdLst>
-    <p:sldId id="256" r:id="rId2"/>
-    <p:sldId id="257" r:id="rId3"/>
-    <p:sldId id="260" r:id="rId4"/>
-    <p:sldId id="261" r:id="rId5"/>
-    <p:sldId id="258" r:id="rId6"/>
-    <p:sldId id="259" r:id="rId7"/>
-    <p:sldId id="262" r:id="rId8"/>
+    <p:sldId id="256" r:id="rId5"/>
+    <p:sldId id="257" r:id="rId6"/>
+    <p:sldId id="260" r:id="rId7"/>
+    <p:sldId id="261" r:id="rId8"/>
+    <p:sldId id="258" r:id="rId9"/>
+    <p:sldId id="259" r:id="rId10"/>
+    <p:sldId id="262" r:id="rId11"/>
   </p:sldIdLst>
   <p:sldSz cx="9144000" cy="5143500" type="screen16x9"/>
   <p:notesSz cx="9144000" cy="5143500"/>
@@ -263,7 +263,7 @@
       </p15:sldGuideLst>
     </p:ext>
     <p:ext uri="http://customooxmlschemas.google.com/">
-      <go:slidesCustomData xmlns:mc="http://schemas.openxmlformats.org/markup-compatibility/2006" xmlns:mv="urn:schemas-microsoft-com:mac:vml" xmlns:c="http://schemas.openxmlformats.org/drawingml/2006/chart" xmlns:dgm="http://schemas.openxmlformats.org/drawingml/2006/diagram" xmlns:o="urn:schemas-microsoft-com:office:office" xmlns:v="urn:schemas-microsoft-com:vml" xmlns:pvml="urn:schemas-microsoft-com:office:powerpoint" xmlns:com="http://schemas.openxmlformats.org/drawingml/2006/compatibility" xmlns:p14="http://schemas.microsoft.com/office/powerpoint/2010/main" xmlns:p15="http://schemas.microsoft.com/office/powerpoint/2012/main" xmlns:ahyp="http://schemas.microsoft.com/office/drawing/2018/hyperlinkcolor" xmlns:go="http://customooxmlschemas.google.com/" xmlns="" r:id="rId30" roundtripDataSignature="AMtx7miQbc/hS4M5PpvmdDnYmJ6508vkOQ=="/>
+      <go:slidesCustomData xmlns="" xmlns:go="http://customooxmlschemas.google.com/" xmlns:ahyp="http://schemas.microsoft.com/office/drawing/2018/hyperlinkcolor" xmlns:p15="http://schemas.microsoft.com/office/powerpoint/2012/main" xmlns:p14="http://schemas.microsoft.com/office/powerpoint/2010/main" xmlns:com="http://schemas.openxmlformats.org/drawingml/2006/compatibility" xmlns:pvml="urn:schemas-microsoft-com:office:powerpoint" xmlns:v="urn:schemas-microsoft-com:vml" xmlns:o="urn:schemas-microsoft-com:office:office" xmlns:dgm="http://schemas.openxmlformats.org/drawingml/2006/diagram" xmlns:c="http://schemas.openxmlformats.org/drawingml/2006/chart" xmlns:mv="urn:schemas-microsoft-com:mac:vml" xmlns:mc="http://schemas.openxmlformats.org/markup-compatibility/2006" r:id="rId30" roundtripDataSignature="AMtx7miQbc/hS4M5PpvmdDnYmJ6508vkOQ=="/>
     </p:ext>
   </p:extLst>
 </p:presentation>
@@ -272,6 +272,7 @@
 <file path=ppt/revisionInfo.xml><?xml version="1.0" encoding="utf-8"?>
 <p1510:revInfo xmlns:a="http://schemas.openxmlformats.org/drawingml/2006/main" xmlns:r="http://schemas.openxmlformats.org/officeDocument/2006/relationships" xmlns:p1510="http://schemas.microsoft.com/office/powerpoint/2015/10/main">
   <p1510:revLst>
+    <p1510:client id="{1B5CFB33-AB22-470C-ABCE-BC01CF358F75}" v="1" dt="2022-10-21T09:22:52.554"/>
     <p1510:client id="{DDFC60E4-B308-B042-BE84-CDA6CD3D0FFF}" v="23" dt="2022-10-06T13:00:37.591"/>
   </p1510:revLst>
 </p1510:revInfo>
@@ -279,240 +280,6 @@
 
 <file path=ppt/changesInfos/changesInfo1.xml><?xml version="1.0" encoding="utf-8"?>
 <pc:chgInfo xmlns:a="http://schemas.openxmlformats.org/drawingml/2006/main" xmlns:r="http://schemas.openxmlformats.org/officeDocument/2006/relationships" xmlns:ac="http://schemas.microsoft.com/office/drawing/2013/main/command" xmlns:pc="http://schemas.microsoft.com/office/powerpoint/2013/main/command">
-  <pc:docChgLst>
-    <pc:chgData name="Rares Cristea" userId="f9d253b3ed5feb74" providerId="LiveId" clId="{79CF5AE7-5A4D-4A6E-8D85-7C0B1ADD45C2}"/>
-    <pc:docChg chg="custSel addSld delSld modSld">
-      <pc:chgData name="Rares Cristea" userId="f9d253b3ed5feb74" providerId="LiveId" clId="{79CF5AE7-5A4D-4A6E-8D85-7C0B1ADD45C2}" dt="2022-10-05T07:20:34.568" v="375" actId="20577"/>
-      <pc:docMkLst>
-        <pc:docMk/>
-      </pc:docMkLst>
-      <pc:sldChg chg="delSp mod">
-        <pc:chgData name="Rares Cristea" userId="f9d253b3ed5feb74" providerId="LiveId" clId="{79CF5AE7-5A4D-4A6E-8D85-7C0B1ADD45C2}" dt="2022-10-05T07:10:58.848" v="36" actId="478"/>
-        <pc:sldMkLst>
-          <pc:docMk/>
-          <pc:sldMk cId="0" sldId="256"/>
-        </pc:sldMkLst>
-        <pc:picChg chg="del">
-          <ac:chgData name="Rares Cristea" userId="f9d253b3ed5feb74" providerId="LiveId" clId="{79CF5AE7-5A4D-4A6E-8D85-7C0B1ADD45C2}" dt="2022-10-05T07:10:58.848" v="36" actId="478"/>
-          <ac:picMkLst>
-            <pc:docMk/>
-            <pc:sldMk cId="0" sldId="256"/>
-            <ac:picMk id="55" creationId="{00000000-0000-0000-0000-000000000000}"/>
-          </ac:picMkLst>
-        </pc:picChg>
-      </pc:sldChg>
-      <pc:sldChg chg="delSp modSp mod">
-        <pc:chgData name="Rares Cristea" userId="f9d253b3ed5feb74" providerId="LiveId" clId="{79CF5AE7-5A4D-4A6E-8D85-7C0B1ADD45C2}" dt="2022-10-05T07:15:20.868" v="283" actId="20577"/>
-        <pc:sldMkLst>
-          <pc:docMk/>
-          <pc:sldMk cId="0" sldId="257"/>
-        </pc:sldMkLst>
-        <pc:spChg chg="mod">
-          <ac:chgData name="Rares Cristea" userId="f9d253b3ed5feb74" providerId="LiveId" clId="{79CF5AE7-5A4D-4A6E-8D85-7C0B1ADD45C2}" dt="2022-10-05T07:10:39.562" v="30" actId="14100"/>
-          <ac:spMkLst>
-            <pc:docMk/>
-            <pc:sldMk cId="0" sldId="257"/>
-            <ac:spMk id="61" creationId="{00000000-0000-0000-0000-000000000000}"/>
-          </ac:spMkLst>
-        </pc:spChg>
-        <pc:spChg chg="mod">
-          <ac:chgData name="Rares Cristea" userId="f9d253b3ed5feb74" providerId="LiveId" clId="{79CF5AE7-5A4D-4A6E-8D85-7C0B1ADD45C2}" dt="2022-10-05T07:15:20.868" v="283" actId="20577"/>
-          <ac:spMkLst>
-            <pc:docMk/>
-            <pc:sldMk cId="0" sldId="257"/>
-            <ac:spMk id="63" creationId="{00000000-0000-0000-0000-000000000000}"/>
-          </ac:spMkLst>
-        </pc:spChg>
-        <pc:spChg chg="del mod">
-          <ac:chgData name="Rares Cristea" userId="f9d253b3ed5feb74" providerId="LiveId" clId="{79CF5AE7-5A4D-4A6E-8D85-7C0B1ADD45C2}" dt="2022-10-05T07:10:54.713" v="35"/>
-          <ac:spMkLst>
-            <pc:docMk/>
-            <pc:sldMk cId="0" sldId="257"/>
-            <ac:spMk id="64" creationId="{00000000-0000-0000-0000-000000000000}"/>
-          </ac:spMkLst>
-        </pc:spChg>
-        <pc:picChg chg="del">
-          <ac:chgData name="Rares Cristea" userId="f9d253b3ed5feb74" providerId="LiveId" clId="{79CF5AE7-5A4D-4A6E-8D85-7C0B1ADD45C2}" dt="2022-10-05T07:10:54.712" v="33" actId="478"/>
-          <ac:picMkLst>
-            <pc:docMk/>
-            <pc:sldMk cId="0" sldId="257"/>
-            <ac:picMk id="66" creationId="{00000000-0000-0000-0000-000000000000}"/>
-          </ac:picMkLst>
-        </pc:picChg>
-      </pc:sldChg>
-      <pc:sldChg chg="addSp delSp modSp add del mod">
-        <pc:chgData name="Rares Cristea" userId="f9d253b3ed5feb74" providerId="LiveId" clId="{79CF5AE7-5A4D-4A6E-8D85-7C0B1ADD45C2}" dt="2022-10-05T07:20:34.568" v="375" actId="20577"/>
-        <pc:sldMkLst>
-          <pc:docMk/>
-          <pc:sldMk cId="196389569" sldId="258"/>
-        </pc:sldMkLst>
-        <pc:spChg chg="add del mod">
-          <ac:chgData name="Rares Cristea" userId="f9d253b3ed5feb74" providerId="LiveId" clId="{79CF5AE7-5A4D-4A6E-8D85-7C0B1ADD45C2}" dt="2022-10-05T07:19:31.147" v="344"/>
-          <ac:spMkLst>
-            <pc:docMk/>
-            <pc:sldMk cId="196389569" sldId="258"/>
-            <ac:spMk id="2" creationId="{B52FD69F-2831-1F3D-7B07-2992AF012202}"/>
-          </ac:spMkLst>
-        </pc:spChg>
-        <pc:spChg chg="add mod">
-          <ac:chgData name="Rares Cristea" userId="f9d253b3ed5feb74" providerId="LiveId" clId="{79CF5AE7-5A4D-4A6E-8D85-7C0B1ADD45C2}" dt="2022-10-05T07:20:34.568" v="375" actId="20577"/>
-          <ac:spMkLst>
-            <pc:docMk/>
-            <pc:sldMk cId="196389569" sldId="258"/>
-            <ac:spMk id="3" creationId="{06B73C8A-95A9-BED5-8B52-74EA70E143C0}"/>
-          </ac:spMkLst>
-        </pc:spChg>
-        <pc:spChg chg="mod">
-          <ac:chgData name="Rares Cristea" userId="f9d253b3ed5feb74" providerId="LiveId" clId="{79CF5AE7-5A4D-4A6E-8D85-7C0B1ADD45C2}" dt="2022-10-05T07:16:04.914" v="323" actId="1076"/>
-          <ac:spMkLst>
-            <pc:docMk/>
-            <pc:sldMk cId="196389569" sldId="258"/>
-            <ac:spMk id="63" creationId="{00000000-0000-0000-0000-000000000000}"/>
-          </ac:spMkLst>
-        </pc:spChg>
-      </pc:sldChg>
-      <pc:sldChg chg="del">
-        <pc:chgData name="Rares Cristea" userId="f9d253b3ed5feb74" providerId="LiveId" clId="{79CF5AE7-5A4D-4A6E-8D85-7C0B1ADD45C2}" dt="2022-10-05T07:01:29.262" v="0" actId="2696"/>
-        <pc:sldMkLst>
-          <pc:docMk/>
-          <pc:sldMk cId="0" sldId="259"/>
-        </pc:sldMkLst>
-      </pc:sldChg>
-      <pc:sldChg chg="del">
-        <pc:chgData name="Rares Cristea" userId="f9d253b3ed5feb74" providerId="LiveId" clId="{79CF5AE7-5A4D-4A6E-8D85-7C0B1ADD45C2}" dt="2022-10-05T07:01:29.262" v="0" actId="2696"/>
-        <pc:sldMkLst>
-          <pc:docMk/>
-          <pc:sldMk cId="0" sldId="260"/>
-        </pc:sldMkLst>
-      </pc:sldChg>
-      <pc:sldChg chg="del">
-        <pc:chgData name="Rares Cristea" userId="f9d253b3ed5feb74" providerId="LiveId" clId="{79CF5AE7-5A4D-4A6E-8D85-7C0B1ADD45C2}" dt="2022-10-05T07:01:29.262" v="0" actId="2696"/>
-        <pc:sldMkLst>
-          <pc:docMk/>
-          <pc:sldMk cId="0" sldId="261"/>
-        </pc:sldMkLst>
-      </pc:sldChg>
-      <pc:sldChg chg="del">
-        <pc:chgData name="Rares Cristea" userId="f9d253b3ed5feb74" providerId="LiveId" clId="{79CF5AE7-5A4D-4A6E-8D85-7C0B1ADD45C2}" dt="2022-10-05T07:01:29.262" v="0" actId="2696"/>
-        <pc:sldMkLst>
-          <pc:docMk/>
-          <pc:sldMk cId="0" sldId="262"/>
-        </pc:sldMkLst>
-      </pc:sldChg>
-      <pc:sldChg chg="del">
-        <pc:chgData name="Rares Cristea" userId="f9d253b3ed5feb74" providerId="LiveId" clId="{79CF5AE7-5A4D-4A6E-8D85-7C0B1ADD45C2}" dt="2022-10-05T07:01:29.262" v="0" actId="2696"/>
-        <pc:sldMkLst>
-          <pc:docMk/>
-          <pc:sldMk cId="0" sldId="263"/>
-        </pc:sldMkLst>
-      </pc:sldChg>
-      <pc:sldChg chg="del">
-        <pc:chgData name="Rares Cristea" userId="f9d253b3ed5feb74" providerId="LiveId" clId="{79CF5AE7-5A4D-4A6E-8D85-7C0B1ADD45C2}" dt="2022-10-05T07:01:29.262" v="0" actId="2696"/>
-        <pc:sldMkLst>
-          <pc:docMk/>
-          <pc:sldMk cId="0" sldId="264"/>
-        </pc:sldMkLst>
-      </pc:sldChg>
-      <pc:sldChg chg="del">
-        <pc:chgData name="Rares Cristea" userId="f9d253b3ed5feb74" providerId="LiveId" clId="{79CF5AE7-5A4D-4A6E-8D85-7C0B1ADD45C2}" dt="2022-10-05T07:01:29.262" v="0" actId="2696"/>
-        <pc:sldMkLst>
-          <pc:docMk/>
-          <pc:sldMk cId="0" sldId="265"/>
-        </pc:sldMkLst>
-      </pc:sldChg>
-      <pc:sldChg chg="del">
-        <pc:chgData name="Rares Cristea" userId="f9d253b3ed5feb74" providerId="LiveId" clId="{79CF5AE7-5A4D-4A6E-8D85-7C0B1ADD45C2}" dt="2022-10-05T07:01:29.262" v="0" actId="2696"/>
-        <pc:sldMkLst>
-          <pc:docMk/>
-          <pc:sldMk cId="0" sldId="266"/>
-        </pc:sldMkLst>
-      </pc:sldChg>
-      <pc:sldChg chg="del">
-        <pc:chgData name="Rares Cristea" userId="f9d253b3ed5feb74" providerId="LiveId" clId="{79CF5AE7-5A4D-4A6E-8D85-7C0B1ADD45C2}" dt="2022-10-05T07:01:29.262" v="0" actId="2696"/>
-        <pc:sldMkLst>
-          <pc:docMk/>
-          <pc:sldMk cId="0" sldId="267"/>
-        </pc:sldMkLst>
-      </pc:sldChg>
-      <pc:sldChg chg="del">
-        <pc:chgData name="Rares Cristea" userId="f9d253b3ed5feb74" providerId="LiveId" clId="{79CF5AE7-5A4D-4A6E-8D85-7C0B1ADD45C2}" dt="2022-10-05T07:01:29.262" v="0" actId="2696"/>
-        <pc:sldMkLst>
-          <pc:docMk/>
-          <pc:sldMk cId="0" sldId="268"/>
-        </pc:sldMkLst>
-      </pc:sldChg>
-      <pc:sldChg chg="del">
-        <pc:chgData name="Rares Cristea" userId="f9d253b3ed5feb74" providerId="LiveId" clId="{79CF5AE7-5A4D-4A6E-8D85-7C0B1ADD45C2}" dt="2022-10-05T07:01:29.262" v="0" actId="2696"/>
-        <pc:sldMkLst>
-          <pc:docMk/>
-          <pc:sldMk cId="0" sldId="269"/>
-        </pc:sldMkLst>
-      </pc:sldChg>
-      <pc:sldChg chg="del">
-        <pc:chgData name="Rares Cristea" userId="f9d253b3ed5feb74" providerId="LiveId" clId="{79CF5AE7-5A4D-4A6E-8D85-7C0B1ADD45C2}" dt="2022-10-05T07:01:29.262" v="0" actId="2696"/>
-        <pc:sldMkLst>
-          <pc:docMk/>
-          <pc:sldMk cId="0" sldId="270"/>
-        </pc:sldMkLst>
-      </pc:sldChg>
-      <pc:sldChg chg="del">
-        <pc:chgData name="Rares Cristea" userId="f9d253b3ed5feb74" providerId="LiveId" clId="{79CF5AE7-5A4D-4A6E-8D85-7C0B1ADD45C2}" dt="2022-10-05T07:01:29.262" v="0" actId="2696"/>
-        <pc:sldMkLst>
-          <pc:docMk/>
-          <pc:sldMk cId="0" sldId="271"/>
-        </pc:sldMkLst>
-      </pc:sldChg>
-      <pc:sldChg chg="del">
-        <pc:chgData name="Rares Cristea" userId="f9d253b3ed5feb74" providerId="LiveId" clId="{79CF5AE7-5A4D-4A6E-8D85-7C0B1ADD45C2}" dt="2022-10-05T07:01:29.262" v="0" actId="2696"/>
-        <pc:sldMkLst>
-          <pc:docMk/>
-          <pc:sldMk cId="0" sldId="272"/>
-        </pc:sldMkLst>
-      </pc:sldChg>
-      <pc:sldChg chg="del">
-        <pc:chgData name="Rares Cristea" userId="f9d253b3ed5feb74" providerId="LiveId" clId="{79CF5AE7-5A4D-4A6E-8D85-7C0B1ADD45C2}" dt="2022-10-05T07:01:29.262" v="0" actId="2696"/>
-        <pc:sldMkLst>
-          <pc:docMk/>
-          <pc:sldMk cId="0" sldId="273"/>
-        </pc:sldMkLst>
-      </pc:sldChg>
-      <pc:sldChg chg="del">
-        <pc:chgData name="Rares Cristea" userId="f9d253b3ed5feb74" providerId="LiveId" clId="{79CF5AE7-5A4D-4A6E-8D85-7C0B1ADD45C2}" dt="2022-10-05T07:01:29.262" v="0" actId="2696"/>
-        <pc:sldMkLst>
-          <pc:docMk/>
-          <pc:sldMk cId="0" sldId="274"/>
-        </pc:sldMkLst>
-      </pc:sldChg>
-      <pc:sldChg chg="del">
-        <pc:chgData name="Rares Cristea" userId="f9d253b3ed5feb74" providerId="LiveId" clId="{79CF5AE7-5A4D-4A6E-8D85-7C0B1ADD45C2}" dt="2022-10-05T07:01:29.262" v="0" actId="2696"/>
-        <pc:sldMkLst>
-          <pc:docMk/>
-          <pc:sldMk cId="0" sldId="275"/>
-        </pc:sldMkLst>
-      </pc:sldChg>
-      <pc:sldChg chg="del">
-        <pc:chgData name="Rares Cristea" userId="f9d253b3ed5feb74" providerId="LiveId" clId="{79CF5AE7-5A4D-4A6E-8D85-7C0B1ADD45C2}" dt="2022-10-05T07:01:29.262" v="0" actId="2696"/>
-        <pc:sldMkLst>
-          <pc:docMk/>
-          <pc:sldMk cId="0" sldId="276"/>
-        </pc:sldMkLst>
-      </pc:sldChg>
-      <pc:sldChg chg="del">
-        <pc:chgData name="Rares Cristea" userId="f9d253b3ed5feb74" providerId="LiveId" clId="{79CF5AE7-5A4D-4A6E-8D85-7C0B1ADD45C2}" dt="2022-10-05T07:01:29.262" v="0" actId="2696"/>
-        <pc:sldMkLst>
-          <pc:docMk/>
-          <pc:sldMk cId="0" sldId="277"/>
-        </pc:sldMkLst>
-      </pc:sldChg>
-      <pc:sldChg chg="del">
-        <pc:chgData name="Rares Cristea" userId="f9d253b3ed5feb74" providerId="LiveId" clId="{79CF5AE7-5A4D-4A6E-8D85-7C0B1ADD45C2}" dt="2022-10-05T07:01:29.262" v="0" actId="2696"/>
-        <pc:sldMkLst>
-          <pc:docMk/>
-          <pc:sldMk cId="0" sldId="278"/>
-        </pc:sldMkLst>
-      </pc:sldChg>
-    </pc:docChg>
-  </pc:docChgLst>
   <pc:docChgLst>
     <pc:chgData name="Rares Cristea" userId="f9d253b3ed5feb74" providerId="LiveId" clId="{DDFC60E4-B308-B042-BE84-CDA6CD3D0FFF}"/>
     <pc:docChg chg="undo custSel addSld delSld modSld">
@@ -757,6 +524,264 @@
             <pc:docMk/>
             <pc:sldMk cId="3241823182" sldId="262"/>
             <ac:spMk id="3" creationId="{CF9A2265-6908-0D2B-8BE9-3C4375EC5A0E}"/>
+          </ac:spMkLst>
+        </pc:spChg>
+      </pc:sldChg>
+    </pc:docChg>
+  </pc:docChgLst>
+  <pc:docChgLst>
+    <pc:chgData name="Rares Cristea" userId="f9d253b3ed5feb74" providerId="LiveId" clId="{79CF5AE7-5A4D-4A6E-8D85-7C0B1ADD45C2}"/>
+    <pc:docChg chg="custSel addSld delSld modSld">
+      <pc:chgData name="Rares Cristea" userId="f9d253b3ed5feb74" providerId="LiveId" clId="{79CF5AE7-5A4D-4A6E-8D85-7C0B1ADD45C2}" dt="2022-10-05T07:20:34.568" v="375" actId="20577"/>
+      <pc:docMkLst>
+        <pc:docMk/>
+      </pc:docMkLst>
+      <pc:sldChg chg="delSp mod">
+        <pc:chgData name="Rares Cristea" userId="f9d253b3ed5feb74" providerId="LiveId" clId="{79CF5AE7-5A4D-4A6E-8D85-7C0B1ADD45C2}" dt="2022-10-05T07:10:58.848" v="36" actId="478"/>
+        <pc:sldMkLst>
+          <pc:docMk/>
+          <pc:sldMk cId="0" sldId="256"/>
+        </pc:sldMkLst>
+        <pc:picChg chg="del">
+          <ac:chgData name="Rares Cristea" userId="f9d253b3ed5feb74" providerId="LiveId" clId="{79CF5AE7-5A4D-4A6E-8D85-7C0B1ADD45C2}" dt="2022-10-05T07:10:58.848" v="36" actId="478"/>
+          <ac:picMkLst>
+            <pc:docMk/>
+            <pc:sldMk cId="0" sldId="256"/>
+            <ac:picMk id="55" creationId="{00000000-0000-0000-0000-000000000000}"/>
+          </ac:picMkLst>
+        </pc:picChg>
+      </pc:sldChg>
+      <pc:sldChg chg="delSp modSp mod">
+        <pc:chgData name="Rares Cristea" userId="f9d253b3ed5feb74" providerId="LiveId" clId="{79CF5AE7-5A4D-4A6E-8D85-7C0B1ADD45C2}" dt="2022-10-05T07:15:20.868" v="283" actId="20577"/>
+        <pc:sldMkLst>
+          <pc:docMk/>
+          <pc:sldMk cId="0" sldId="257"/>
+        </pc:sldMkLst>
+        <pc:spChg chg="mod">
+          <ac:chgData name="Rares Cristea" userId="f9d253b3ed5feb74" providerId="LiveId" clId="{79CF5AE7-5A4D-4A6E-8D85-7C0B1ADD45C2}" dt="2022-10-05T07:10:39.562" v="30" actId="14100"/>
+          <ac:spMkLst>
+            <pc:docMk/>
+            <pc:sldMk cId="0" sldId="257"/>
+            <ac:spMk id="61" creationId="{00000000-0000-0000-0000-000000000000}"/>
+          </ac:spMkLst>
+        </pc:spChg>
+        <pc:spChg chg="mod">
+          <ac:chgData name="Rares Cristea" userId="f9d253b3ed5feb74" providerId="LiveId" clId="{79CF5AE7-5A4D-4A6E-8D85-7C0B1ADD45C2}" dt="2022-10-05T07:15:20.868" v="283" actId="20577"/>
+          <ac:spMkLst>
+            <pc:docMk/>
+            <pc:sldMk cId="0" sldId="257"/>
+            <ac:spMk id="63" creationId="{00000000-0000-0000-0000-000000000000}"/>
+          </ac:spMkLst>
+        </pc:spChg>
+        <pc:spChg chg="del mod">
+          <ac:chgData name="Rares Cristea" userId="f9d253b3ed5feb74" providerId="LiveId" clId="{79CF5AE7-5A4D-4A6E-8D85-7C0B1ADD45C2}" dt="2022-10-05T07:10:54.713" v="35"/>
+          <ac:spMkLst>
+            <pc:docMk/>
+            <pc:sldMk cId="0" sldId="257"/>
+            <ac:spMk id="64" creationId="{00000000-0000-0000-0000-000000000000}"/>
+          </ac:spMkLst>
+        </pc:spChg>
+        <pc:picChg chg="del">
+          <ac:chgData name="Rares Cristea" userId="f9d253b3ed5feb74" providerId="LiveId" clId="{79CF5AE7-5A4D-4A6E-8D85-7C0B1ADD45C2}" dt="2022-10-05T07:10:54.712" v="33" actId="478"/>
+          <ac:picMkLst>
+            <pc:docMk/>
+            <pc:sldMk cId="0" sldId="257"/>
+            <ac:picMk id="66" creationId="{00000000-0000-0000-0000-000000000000}"/>
+          </ac:picMkLst>
+        </pc:picChg>
+      </pc:sldChg>
+      <pc:sldChg chg="addSp delSp modSp add del mod">
+        <pc:chgData name="Rares Cristea" userId="f9d253b3ed5feb74" providerId="LiveId" clId="{79CF5AE7-5A4D-4A6E-8D85-7C0B1ADD45C2}" dt="2022-10-05T07:20:34.568" v="375" actId="20577"/>
+        <pc:sldMkLst>
+          <pc:docMk/>
+          <pc:sldMk cId="196389569" sldId="258"/>
+        </pc:sldMkLst>
+        <pc:spChg chg="add del mod">
+          <ac:chgData name="Rares Cristea" userId="f9d253b3ed5feb74" providerId="LiveId" clId="{79CF5AE7-5A4D-4A6E-8D85-7C0B1ADD45C2}" dt="2022-10-05T07:19:31.147" v="344"/>
+          <ac:spMkLst>
+            <pc:docMk/>
+            <pc:sldMk cId="196389569" sldId="258"/>
+            <ac:spMk id="2" creationId="{B52FD69F-2831-1F3D-7B07-2992AF012202}"/>
+          </ac:spMkLst>
+        </pc:spChg>
+        <pc:spChg chg="add mod">
+          <ac:chgData name="Rares Cristea" userId="f9d253b3ed5feb74" providerId="LiveId" clId="{79CF5AE7-5A4D-4A6E-8D85-7C0B1ADD45C2}" dt="2022-10-05T07:20:34.568" v="375" actId="20577"/>
+          <ac:spMkLst>
+            <pc:docMk/>
+            <pc:sldMk cId="196389569" sldId="258"/>
+            <ac:spMk id="3" creationId="{06B73C8A-95A9-BED5-8B52-74EA70E143C0}"/>
+          </ac:spMkLst>
+        </pc:spChg>
+        <pc:spChg chg="mod">
+          <ac:chgData name="Rares Cristea" userId="f9d253b3ed5feb74" providerId="LiveId" clId="{79CF5AE7-5A4D-4A6E-8D85-7C0B1ADD45C2}" dt="2022-10-05T07:16:04.914" v="323" actId="1076"/>
+          <ac:spMkLst>
+            <pc:docMk/>
+            <pc:sldMk cId="196389569" sldId="258"/>
+            <ac:spMk id="63" creationId="{00000000-0000-0000-0000-000000000000}"/>
+          </ac:spMkLst>
+        </pc:spChg>
+      </pc:sldChg>
+      <pc:sldChg chg="del">
+        <pc:chgData name="Rares Cristea" userId="f9d253b3ed5feb74" providerId="LiveId" clId="{79CF5AE7-5A4D-4A6E-8D85-7C0B1ADD45C2}" dt="2022-10-05T07:01:29.262" v="0" actId="2696"/>
+        <pc:sldMkLst>
+          <pc:docMk/>
+          <pc:sldMk cId="3694047117" sldId="259"/>
+        </pc:sldMkLst>
+      </pc:sldChg>
+      <pc:sldChg chg="del">
+        <pc:chgData name="Rares Cristea" userId="f9d253b3ed5feb74" providerId="LiveId" clId="{79CF5AE7-5A4D-4A6E-8D85-7C0B1ADD45C2}" dt="2022-10-05T07:01:29.262" v="0" actId="2696"/>
+        <pc:sldMkLst>
+          <pc:docMk/>
+          <pc:sldMk cId="3956832934" sldId="260"/>
+        </pc:sldMkLst>
+      </pc:sldChg>
+      <pc:sldChg chg="del">
+        <pc:chgData name="Rares Cristea" userId="f9d253b3ed5feb74" providerId="LiveId" clId="{79CF5AE7-5A4D-4A6E-8D85-7C0B1ADD45C2}" dt="2022-10-05T07:01:29.262" v="0" actId="2696"/>
+        <pc:sldMkLst>
+          <pc:docMk/>
+          <pc:sldMk cId="1683804796" sldId="261"/>
+        </pc:sldMkLst>
+      </pc:sldChg>
+      <pc:sldChg chg="del">
+        <pc:chgData name="Rares Cristea" userId="f9d253b3ed5feb74" providerId="LiveId" clId="{79CF5AE7-5A4D-4A6E-8D85-7C0B1ADD45C2}" dt="2022-10-05T07:01:29.262" v="0" actId="2696"/>
+        <pc:sldMkLst>
+          <pc:docMk/>
+          <pc:sldMk cId="594131174" sldId="262"/>
+        </pc:sldMkLst>
+      </pc:sldChg>
+      <pc:sldChg chg="del">
+        <pc:chgData name="Rares Cristea" userId="f9d253b3ed5feb74" providerId="LiveId" clId="{79CF5AE7-5A4D-4A6E-8D85-7C0B1ADD45C2}" dt="2022-10-05T07:01:29.262" v="0" actId="2696"/>
+        <pc:sldMkLst>
+          <pc:docMk/>
+          <pc:sldMk cId="0" sldId="263"/>
+        </pc:sldMkLst>
+      </pc:sldChg>
+      <pc:sldChg chg="del">
+        <pc:chgData name="Rares Cristea" userId="f9d253b3ed5feb74" providerId="LiveId" clId="{79CF5AE7-5A4D-4A6E-8D85-7C0B1ADD45C2}" dt="2022-10-05T07:01:29.262" v="0" actId="2696"/>
+        <pc:sldMkLst>
+          <pc:docMk/>
+          <pc:sldMk cId="0" sldId="264"/>
+        </pc:sldMkLst>
+      </pc:sldChg>
+      <pc:sldChg chg="del">
+        <pc:chgData name="Rares Cristea" userId="f9d253b3ed5feb74" providerId="LiveId" clId="{79CF5AE7-5A4D-4A6E-8D85-7C0B1ADD45C2}" dt="2022-10-05T07:01:29.262" v="0" actId="2696"/>
+        <pc:sldMkLst>
+          <pc:docMk/>
+          <pc:sldMk cId="0" sldId="265"/>
+        </pc:sldMkLst>
+      </pc:sldChg>
+      <pc:sldChg chg="del">
+        <pc:chgData name="Rares Cristea" userId="f9d253b3ed5feb74" providerId="LiveId" clId="{79CF5AE7-5A4D-4A6E-8D85-7C0B1ADD45C2}" dt="2022-10-05T07:01:29.262" v="0" actId="2696"/>
+        <pc:sldMkLst>
+          <pc:docMk/>
+          <pc:sldMk cId="0" sldId="266"/>
+        </pc:sldMkLst>
+      </pc:sldChg>
+      <pc:sldChg chg="del">
+        <pc:chgData name="Rares Cristea" userId="f9d253b3ed5feb74" providerId="LiveId" clId="{79CF5AE7-5A4D-4A6E-8D85-7C0B1ADD45C2}" dt="2022-10-05T07:01:29.262" v="0" actId="2696"/>
+        <pc:sldMkLst>
+          <pc:docMk/>
+          <pc:sldMk cId="0" sldId="267"/>
+        </pc:sldMkLst>
+      </pc:sldChg>
+      <pc:sldChg chg="del">
+        <pc:chgData name="Rares Cristea" userId="f9d253b3ed5feb74" providerId="LiveId" clId="{79CF5AE7-5A4D-4A6E-8D85-7C0B1ADD45C2}" dt="2022-10-05T07:01:29.262" v="0" actId="2696"/>
+        <pc:sldMkLst>
+          <pc:docMk/>
+          <pc:sldMk cId="0" sldId="268"/>
+        </pc:sldMkLst>
+      </pc:sldChg>
+      <pc:sldChg chg="del">
+        <pc:chgData name="Rares Cristea" userId="f9d253b3ed5feb74" providerId="LiveId" clId="{79CF5AE7-5A4D-4A6E-8D85-7C0B1ADD45C2}" dt="2022-10-05T07:01:29.262" v="0" actId="2696"/>
+        <pc:sldMkLst>
+          <pc:docMk/>
+          <pc:sldMk cId="0" sldId="269"/>
+        </pc:sldMkLst>
+      </pc:sldChg>
+      <pc:sldChg chg="del">
+        <pc:chgData name="Rares Cristea" userId="f9d253b3ed5feb74" providerId="LiveId" clId="{79CF5AE7-5A4D-4A6E-8D85-7C0B1ADD45C2}" dt="2022-10-05T07:01:29.262" v="0" actId="2696"/>
+        <pc:sldMkLst>
+          <pc:docMk/>
+          <pc:sldMk cId="0" sldId="270"/>
+        </pc:sldMkLst>
+      </pc:sldChg>
+      <pc:sldChg chg="del">
+        <pc:chgData name="Rares Cristea" userId="f9d253b3ed5feb74" providerId="LiveId" clId="{79CF5AE7-5A4D-4A6E-8D85-7C0B1ADD45C2}" dt="2022-10-05T07:01:29.262" v="0" actId="2696"/>
+        <pc:sldMkLst>
+          <pc:docMk/>
+          <pc:sldMk cId="0" sldId="271"/>
+        </pc:sldMkLst>
+      </pc:sldChg>
+      <pc:sldChg chg="del">
+        <pc:chgData name="Rares Cristea" userId="f9d253b3ed5feb74" providerId="LiveId" clId="{79CF5AE7-5A4D-4A6E-8D85-7C0B1ADD45C2}" dt="2022-10-05T07:01:29.262" v="0" actId="2696"/>
+        <pc:sldMkLst>
+          <pc:docMk/>
+          <pc:sldMk cId="0" sldId="272"/>
+        </pc:sldMkLst>
+      </pc:sldChg>
+      <pc:sldChg chg="del">
+        <pc:chgData name="Rares Cristea" userId="f9d253b3ed5feb74" providerId="LiveId" clId="{79CF5AE7-5A4D-4A6E-8D85-7C0B1ADD45C2}" dt="2022-10-05T07:01:29.262" v="0" actId="2696"/>
+        <pc:sldMkLst>
+          <pc:docMk/>
+          <pc:sldMk cId="0" sldId="273"/>
+        </pc:sldMkLst>
+      </pc:sldChg>
+      <pc:sldChg chg="del">
+        <pc:chgData name="Rares Cristea" userId="f9d253b3ed5feb74" providerId="LiveId" clId="{79CF5AE7-5A4D-4A6E-8D85-7C0B1ADD45C2}" dt="2022-10-05T07:01:29.262" v="0" actId="2696"/>
+        <pc:sldMkLst>
+          <pc:docMk/>
+          <pc:sldMk cId="0" sldId="274"/>
+        </pc:sldMkLst>
+      </pc:sldChg>
+      <pc:sldChg chg="del">
+        <pc:chgData name="Rares Cristea" userId="f9d253b3ed5feb74" providerId="LiveId" clId="{79CF5AE7-5A4D-4A6E-8D85-7C0B1ADD45C2}" dt="2022-10-05T07:01:29.262" v="0" actId="2696"/>
+        <pc:sldMkLst>
+          <pc:docMk/>
+          <pc:sldMk cId="0" sldId="275"/>
+        </pc:sldMkLst>
+      </pc:sldChg>
+      <pc:sldChg chg="del">
+        <pc:chgData name="Rares Cristea" userId="f9d253b3ed5feb74" providerId="LiveId" clId="{79CF5AE7-5A4D-4A6E-8D85-7C0B1ADD45C2}" dt="2022-10-05T07:01:29.262" v="0" actId="2696"/>
+        <pc:sldMkLst>
+          <pc:docMk/>
+          <pc:sldMk cId="0" sldId="276"/>
+        </pc:sldMkLst>
+      </pc:sldChg>
+      <pc:sldChg chg="del">
+        <pc:chgData name="Rares Cristea" userId="f9d253b3ed5feb74" providerId="LiveId" clId="{79CF5AE7-5A4D-4A6E-8D85-7C0B1ADD45C2}" dt="2022-10-05T07:01:29.262" v="0" actId="2696"/>
+        <pc:sldMkLst>
+          <pc:docMk/>
+          <pc:sldMk cId="0" sldId="277"/>
+        </pc:sldMkLst>
+      </pc:sldChg>
+      <pc:sldChg chg="del">
+        <pc:chgData name="Rares Cristea" userId="f9d253b3ed5feb74" providerId="LiveId" clId="{79CF5AE7-5A4D-4A6E-8D85-7C0B1ADD45C2}" dt="2022-10-05T07:01:29.262" v="0" actId="2696"/>
+        <pc:sldMkLst>
+          <pc:docMk/>
+          <pc:sldMk cId="0" sldId="278"/>
+        </pc:sldMkLst>
+      </pc:sldChg>
+    </pc:docChg>
+  </pc:docChgLst>
+  <pc:docChgLst>
+    <pc:chgData name="RUXANDRA IOANA STRATAN" userId="S::ruxandra.stratan@s.unibuc.ro::6bf8c968-a5b5-45b0-a629-28554835ec18" providerId="AD" clId="Web-{1B5CFB33-AB22-470C-ABCE-BC01CF358F75}"/>
+    <pc:docChg chg="modSld">
+      <pc:chgData name="RUXANDRA IOANA STRATAN" userId="S::ruxandra.stratan@s.unibuc.ro::6bf8c968-a5b5-45b0-a629-28554835ec18" providerId="AD" clId="Web-{1B5CFB33-AB22-470C-ABCE-BC01CF358F75}" dt="2022-10-21T09:22:52.554" v="0" actId="1076"/>
+      <pc:docMkLst>
+        <pc:docMk/>
+      </pc:docMkLst>
+      <pc:sldChg chg="modSp">
+        <pc:chgData name="RUXANDRA IOANA STRATAN" userId="S::ruxandra.stratan@s.unibuc.ro::6bf8c968-a5b5-45b0-a629-28554835ec18" providerId="AD" clId="Web-{1B5CFB33-AB22-470C-ABCE-BC01CF358F75}" dt="2022-10-21T09:22:52.554" v="0" actId="1076"/>
+        <pc:sldMkLst>
+          <pc:docMk/>
+          <pc:sldMk cId="594131174" sldId="262"/>
+        </pc:sldMkLst>
+        <pc:spChg chg="mod">
+          <ac:chgData name="RUXANDRA IOANA STRATAN" userId="S::ruxandra.stratan@s.unibuc.ro::6bf8c968-a5b5-45b0-a629-28554835ec18" providerId="AD" clId="Web-{1B5CFB33-AB22-470C-ABCE-BC01CF358F75}" dt="2022-10-21T09:22:52.554" v="0" actId="1076"/>
+          <ac:spMkLst>
+            <pc:docMk/>
+            <pc:sldMk cId="594131174" sldId="262"/>
+            <ac:spMk id="3" creationId="{FCB5D30D-0F56-3DC0-F801-84E161FE5EB7}"/>
           </ac:spMkLst>
         </pc:spChg>
       </pc:sldChg>
@@ -12486,7 +12511,7 @@
         </p:nvSpPr>
         <p:spPr>
           <a:xfrm>
-            <a:off x="2468898" y="2433250"/>
+            <a:off x="2348582" y="2433250"/>
             <a:ext cx="4206200" cy="276999"/>
           </a:xfrm>
         </p:spPr>
@@ -13084,6 +13109,15 @@
 </file>
 
 <file path=customXml/item1.xml><?xml version="1.0" encoding="utf-8"?>
+<?mso-contentType ?>
+<FormTemplates xmlns="http://schemas.microsoft.com/sharepoint/v3/contenttype/forms">
+  <Display>DocumentLibraryForm</Display>
+  <Edit>DocumentLibraryForm</Edit>
+  <New>DocumentLibraryForm</New>
+</FormTemplates>
+</file>
+
+<file path=customXml/item2.xml><?xml version="1.0" encoding="utf-8"?>
 <ct:contentTypeSchema xmlns:ct="http://schemas.microsoft.com/office/2006/metadata/contentType" xmlns:ma="http://schemas.microsoft.com/office/2006/metadata/properties/metaAttributes" ct:_="" ma:_="" ma:contentTypeName="Document" ma:contentTypeID="0x010100DF1F5BF9BA03CD448733D401D2715B86" ma:contentTypeVersion="4" ma:contentTypeDescription="Create a new document." ma:contentTypeScope="" ma:versionID="a75a137c1f30466e0f479cdd60f54568">
   <xsd:schema xmlns:xsd="http://www.w3.org/2001/XMLSchema" xmlns:xs="http://www.w3.org/2001/XMLSchema" xmlns:p="http://schemas.microsoft.com/office/2006/metadata/properties" xmlns:ns2="d040b213-39be-4216-a7d7-4c420e05192f" xmlns:ns3="d5984b22-f06d-428a-9753-d5eac3e5b778" targetNamespace="http://schemas.microsoft.com/office/2006/metadata/properties" ma:root="true" ma:fieldsID="fb54559c99fccfc02cfb6c1b072af686" ns2:_="" ns3:_="">
     <xsd:import namespace="d040b213-39be-4216-a7d7-4c420e05192f"/>
@@ -13248,15 +13282,6 @@
 </ct:contentTypeSchema>
 </file>
 
-<file path=customXml/item2.xml><?xml version="1.0" encoding="utf-8"?>
-<?mso-contentType ?>
-<FormTemplates xmlns="http://schemas.microsoft.com/sharepoint/v3/contenttype/forms">
-  <Display>DocumentLibraryForm</Display>
-  <Edit>DocumentLibraryForm</Edit>
-  <New>DocumentLibraryForm</New>
-</FormTemplates>
-</file>
-
 <file path=customXml/item3.xml><?xml version="1.0" encoding="utf-8"?>
 <p:properties xmlns:p="http://schemas.microsoft.com/office/2006/metadata/properties" xmlns:xsi="http://www.w3.org/2001/XMLSchema-instance" xmlns:pc="http://schemas.microsoft.com/office/infopath/2007/PartnerControls">
   <documentManagement/>
@@ -13264,13 +13289,37 @@
 </file>
 
 <file path=customXml/itemProps1.xml><?xml version="1.0" encoding="utf-8"?>
-<ds:datastoreItem xmlns:ds="http://schemas.openxmlformats.org/officeDocument/2006/customXml" ds:itemID="{09E4D27F-0411-425B-BB71-FA6B7BC03859}"/>
+<ds:datastoreItem xmlns:ds="http://schemas.openxmlformats.org/officeDocument/2006/customXml" ds:itemID="{F147F6ED-72BB-4B93-872B-DAD5B7A98A7C}">
+  <ds:schemaRefs>
+    <ds:schemaRef ds:uri="http://schemas.microsoft.com/sharepoint/v3/contenttype/forms"/>
+  </ds:schemaRefs>
+</ds:datastoreItem>
 </file>
 
 <file path=customXml/itemProps2.xml><?xml version="1.0" encoding="utf-8"?>
-<ds:datastoreItem xmlns:ds="http://schemas.openxmlformats.org/officeDocument/2006/customXml" ds:itemID="{F147F6ED-72BB-4B93-872B-DAD5B7A98A7C}"/>
+<ds:datastoreItem xmlns:ds="http://schemas.openxmlformats.org/officeDocument/2006/customXml" ds:itemID="{09E4D27F-0411-425B-BB71-FA6B7BC03859}">
+  <ds:schemaRefs>
+    <ds:schemaRef ds:uri="http://schemas.microsoft.com/office/2006/metadata/contentType"/>
+    <ds:schemaRef ds:uri="http://schemas.microsoft.com/office/2006/metadata/properties/metaAttributes"/>
+    <ds:schemaRef ds:uri="http://www.w3.org/2001/XMLSchema"/>
+    <ds:schemaRef ds:uri="http://schemas.microsoft.com/office/2006/metadata/properties"/>
+    <ds:schemaRef ds:uri="d040b213-39be-4216-a7d7-4c420e05192f"/>
+    <ds:schemaRef ds:uri="d5984b22-f06d-428a-9753-d5eac3e5b778"/>
+    <ds:schemaRef ds:uri="http://schemas.microsoft.com/office/2006/documentManagement/types"/>
+    <ds:schemaRef ds:uri="http://schemas.microsoft.com/office/infopath/2007/PartnerControls"/>
+    <ds:schemaRef ds:uri="http://schemas.openxmlformats.org/package/2006/metadata/core-properties"/>
+    <ds:schemaRef ds:uri="http://purl.org/dc/elements/1.1/"/>
+    <ds:schemaRef ds:uri="http://purl.org/dc/terms/"/>
+    <ds:schemaRef ds:uri="http://schemas.microsoft.com/internal/obd"/>
+  </ds:schemaRefs>
+</ds:datastoreItem>
 </file>
 
 <file path=customXml/itemProps3.xml><?xml version="1.0" encoding="utf-8"?>
-<ds:datastoreItem xmlns:ds="http://schemas.openxmlformats.org/officeDocument/2006/customXml" ds:itemID="{2EDBA654-9CCF-480B-94DD-C084E09ED8D8}"/>
+<ds:datastoreItem xmlns:ds="http://schemas.openxmlformats.org/officeDocument/2006/customXml" ds:itemID="{2EDBA654-9CCF-480B-94DD-C084E09ED8D8}">
+  <ds:schemaRefs>
+    <ds:schemaRef ds:uri="http://schemas.microsoft.com/office/2006/metadata/properties"/>
+    <ds:schemaRef ds:uri="http://schemas.microsoft.com/office/infopath/2007/PartnerControls"/>
+  </ds:schemaRefs>
+</ds:datastoreItem>
 </file>
</xml_diff>

<commit_message>
added courses and labs for software engineering
</commit_message>
<xml_diff>
--- a/Anul 3/Semestrul 1/Inginerie Software/Laborator/Lab 1 - Team Formation.pptx
+++ b/Anul 3/Semestrul 1/Inginerie Software/Laborator/Lab 1 - Team Formation.pptx
@@ -13118,8 +13118,8 @@
 </file>
 
 <file path=customXml/item2.xml><?xml version="1.0" encoding="utf-8"?>
-<ct:contentTypeSchema xmlns:ct="http://schemas.microsoft.com/office/2006/metadata/contentType" xmlns:ma="http://schemas.microsoft.com/office/2006/metadata/properties/metaAttributes" ct:_="" ma:_="" ma:contentTypeName="Document" ma:contentTypeID="0x010100DF1F5BF9BA03CD448733D401D2715B86" ma:contentTypeVersion="4" ma:contentTypeDescription="Create a new document." ma:contentTypeScope="" ma:versionID="a75a137c1f30466e0f479cdd60f54568">
-  <xsd:schema xmlns:xsd="http://www.w3.org/2001/XMLSchema" xmlns:xs="http://www.w3.org/2001/XMLSchema" xmlns:p="http://schemas.microsoft.com/office/2006/metadata/properties" xmlns:ns2="d040b213-39be-4216-a7d7-4c420e05192f" xmlns:ns3="d5984b22-f06d-428a-9753-d5eac3e5b778" targetNamespace="http://schemas.microsoft.com/office/2006/metadata/properties" ma:root="true" ma:fieldsID="fb54559c99fccfc02cfb6c1b072af686" ns2:_="" ns3:_="">
+<ct:contentTypeSchema xmlns:ct="http://schemas.microsoft.com/office/2006/metadata/contentType" xmlns:ma="http://schemas.microsoft.com/office/2006/metadata/properties/metaAttributes" ct:_="" ma:_="" ma:contentTypeName="Document" ma:contentTypeID="0x010100DF1F5BF9BA03CD448733D401D2715B86" ma:contentTypeVersion="12" ma:contentTypeDescription="Create a new document." ma:contentTypeScope="" ma:versionID="3c319908db5fd00f991a64bc1845f090">
+  <xsd:schema xmlns:xsd="http://www.w3.org/2001/XMLSchema" xmlns:xs="http://www.w3.org/2001/XMLSchema" xmlns:p="http://schemas.microsoft.com/office/2006/metadata/properties" xmlns:ns2="d040b213-39be-4216-a7d7-4c420e05192f" xmlns:ns3="d5984b22-f06d-428a-9753-d5eac3e5b778" targetNamespace="http://schemas.microsoft.com/office/2006/metadata/properties" ma:root="true" ma:fieldsID="b231174e851e0aa6135f59a7a0b5a9a5" ns2:_="" ns3:_="">
     <xsd:import namespace="d040b213-39be-4216-a7d7-4c420e05192f"/>
     <xsd:import namespace="d5984b22-f06d-428a-9753-d5eac3e5b778"/>
     <xsd:element name="properties">
@@ -13132,6 +13132,13 @@
                 <xsd:element ref="ns2:SharedWithDetails" minOccurs="0"/>
                 <xsd:element ref="ns3:MediaServiceMetadata" minOccurs="0"/>
                 <xsd:element ref="ns3:MediaServiceFastMetadata" minOccurs="0"/>
+                <xsd:element ref="ns3:MediaServiceDateTaken" minOccurs="0"/>
+                <xsd:element ref="ns3:MediaLengthInSeconds" minOccurs="0"/>
+                <xsd:element ref="ns3:lcf76f155ced4ddcb4097134ff3c332f" minOccurs="0"/>
+                <xsd:element ref="ns2:TaxCatchAll" minOccurs="0"/>
+                <xsd:element ref="ns3:MediaServiceOCR" minOccurs="0"/>
+                <xsd:element ref="ns3:MediaServiceGenerationTime" minOccurs="0"/>
+                <xsd:element ref="ns3:MediaServiceEventHashCode" minOccurs="0"/>
               </xsd:all>
             </xsd:complexType>
           </xsd:element>
@@ -13168,6 +13175,17 @@
         </xsd:restriction>
       </xsd:simpleType>
     </xsd:element>
+    <xsd:element name="TaxCatchAll" ma:index="16" nillable="true" ma:displayName="Taxonomy Catch All Column" ma:hidden="true" ma:list="{d9aee7e1-18f7-45f4-99b2-baa0db6433f8}" ma:internalName="TaxCatchAll" ma:showField="CatchAllData" ma:web="d040b213-39be-4216-a7d7-4c420e05192f">
+      <xsd:complexType>
+        <xsd:complexContent>
+          <xsd:extension base="dms:MultiChoiceLookup">
+            <xsd:sequence>
+              <xsd:element name="Value" type="dms:Lookup" maxOccurs="unbounded" minOccurs="0" nillable="true"/>
+            </xsd:sequence>
+          </xsd:extension>
+        </xsd:complexContent>
+      </xsd:complexType>
+    </xsd:element>
   </xsd:schema>
   <xsd:schema xmlns:xsd="http://www.w3.org/2001/XMLSchema" xmlns:xs="http://www.w3.org/2001/XMLSchema" xmlns:dms="http://schemas.microsoft.com/office/2006/documentManagement/types" xmlns:pc="http://schemas.microsoft.com/office/infopath/2007/PartnerControls" targetNamespace="d5984b22-f06d-428a-9753-d5eac3e5b778" elementFormDefault="qualified">
     <xsd:import namespace="http://schemas.microsoft.com/office/2006/documentManagement/types"/>
@@ -13180,6 +13198,40 @@
     <xsd:element name="MediaServiceFastMetadata" ma:index="11" nillable="true" ma:displayName="MediaServiceFastMetadata" ma:hidden="true" ma:internalName="MediaServiceFastMetadata" ma:readOnly="true">
       <xsd:simpleType>
         <xsd:restriction base="dms:Note"/>
+      </xsd:simpleType>
+    </xsd:element>
+    <xsd:element name="MediaServiceDateTaken" ma:index="12" nillable="true" ma:displayName="MediaServiceDateTaken" ma:hidden="true" ma:indexed="true" ma:internalName="MediaServiceDateTaken" ma:readOnly="true">
+      <xsd:simpleType>
+        <xsd:restriction base="dms:Text"/>
+      </xsd:simpleType>
+    </xsd:element>
+    <xsd:element name="MediaLengthInSeconds" ma:index="13" nillable="true" ma:displayName="MediaLengthInSeconds" ma:hidden="true" ma:internalName="MediaLengthInSeconds" ma:readOnly="true">
+      <xsd:simpleType>
+        <xsd:restriction base="dms:Unknown"/>
+      </xsd:simpleType>
+    </xsd:element>
+    <xsd:element name="lcf76f155ced4ddcb4097134ff3c332f" ma:index="15" nillable="true" ma:taxonomy="true" ma:internalName="lcf76f155ced4ddcb4097134ff3c332f" ma:taxonomyFieldName="MediaServiceImageTags" ma:displayName="Image Tags" ma:readOnly="false" ma:fieldId="{5cf76f15-5ced-4ddc-b409-7134ff3c332f}" ma:taxonomyMulti="true" ma:sspId="f5cd9f51-4d1e-4d57-bf3d-f118fc5c8090" ma:termSetId="09814cd3-568e-fe90-9814-8d621ff8fb84" ma:anchorId="fba54fb3-c3e1-fe81-a776-ca4b69148c4d" ma:open="true" ma:isKeyword="false">
+      <xsd:complexType>
+        <xsd:sequence>
+          <xsd:element ref="pc:Terms" minOccurs="0" maxOccurs="1"/>
+        </xsd:sequence>
+      </xsd:complexType>
+    </xsd:element>
+    <xsd:element name="MediaServiceOCR" ma:index="17" nillable="true" ma:displayName="Extracted Text" ma:internalName="MediaServiceOCR" ma:readOnly="true">
+      <xsd:simpleType>
+        <xsd:restriction base="dms:Note">
+          <xsd:maxLength value="255"/>
+        </xsd:restriction>
+      </xsd:simpleType>
+    </xsd:element>
+    <xsd:element name="MediaServiceGenerationTime" ma:index="18" nillable="true" ma:displayName="MediaServiceGenerationTime" ma:hidden="true" ma:internalName="MediaServiceGenerationTime" ma:readOnly="true">
+      <xsd:simpleType>
+        <xsd:restriction base="dms:Text"/>
+      </xsd:simpleType>
+    </xsd:element>
+    <xsd:element name="MediaServiceEventHashCode" ma:index="19" nillable="true" ma:displayName="MediaServiceEventHashCode" ma:hidden="true" ma:internalName="MediaServiceEventHashCode" ma:readOnly="true">
+      <xsd:simpleType>
+        <xsd:restriction base="dms:Text"/>
       </xsd:simpleType>
     </xsd:element>
   </xsd:schema>
@@ -13284,7 +13336,12 @@
 
 <file path=customXml/item3.xml><?xml version="1.0" encoding="utf-8"?>
 <p:properties xmlns:p="http://schemas.microsoft.com/office/2006/metadata/properties" xmlns:xsi="http://www.w3.org/2001/XMLSchema-instance" xmlns:pc="http://schemas.microsoft.com/office/infopath/2007/PartnerControls">
-  <documentManagement/>
+  <documentManagement>
+    <lcf76f155ced4ddcb4097134ff3c332f xmlns="d5984b22-f06d-428a-9753-d5eac3e5b778">
+      <Terms xmlns="http://schemas.microsoft.com/office/infopath/2007/PartnerControls"/>
+    </lcf76f155ced4ddcb4097134ff3c332f>
+    <TaxCatchAll xmlns="d040b213-39be-4216-a7d7-4c420e05192f" xsi:nil="true"/>
+  </documentManagement>
 </p:properties>
 </file>
 
@@ -13297,22 +13354,7 @@
 </file>
 
 <file path=customXml/itemProps2.xml><?xml version="1.0" encoding="utf-8"?>
-<ds:datastoreItem xmlns:ds="http://schemas.openxmlformats.org/officeDocument/2006/customXml" ds:itemID="{09E4D27F-0411-425B-BB71-FA6B7BC03859}">
-  <ds:schemaRefs>
-    <ds:schemaRef ds:uri="http://schemas.microsoft.com/office/2006/metadata/contentType"/>
-    <ds:schemaRef ds:uri="http://schemas.microsoft.com/office/2006/metadata/properties/metaAttributes"/>
-    <ds:schemaRef ds:uri="http://www.w3.org/2001/XMLSchema"/>
-    <ds:schemaRef ds:uri="http://schemas.microsoft.com/office/2006/metadata/properties"/>
-    <ds:schemaRef ds:uri="d040b213-39be-4216-a7d7-4c420e05192f"/>
-    <ds:schemaRef ds:uri="d5984b22-f06d-428a-9753-d5eac3e5b778"/>
-    <ds:schemaRef ds:uri="http://schemas.microsoft.com/office/2006/documentManagement/types"/>
-    <ds:schemaRef ds:uri="http://schemas.microsoft.com/office/infopath/2007/PartnerControls"/>
-    <ds:schemaRef ds:uri="http://schemas.openxmlformats.org/package/2006/metadata/core-properties"/>
-    <ds:schemaRef ds:uri="http://purl.org/dc/elements/1.1/"/>
-    <ds:schemaRef ds:uri="http://purl.org/dc/terms/"/>
-    <ds:schemaRef ds:uri="http://schemas.microsoft.com/internal/obd"/>
-  </ds:schemaRefs>
-</ds:datastoreItem>
+<ds:datastoreItem xmlns:ds="http://schemas.openxmlformats.org/officeDocument/2006/customXml" ds:itemID="{47C6EB3F-703B-4002-8F1B-A57135885787}"/>
 </file>
 
 <file path=customXml/itemProps3.xml><?xml version="1.0" encoding="utf-8"?>

</xml_diff>